<commit_message>
Update Prezentace aktuálního postupu.pptx
</commit_message>
<xml_diff>
--- a/Dokumenty/Prezentace aktuálního postupu.pptx
+++ b/Dokumenty/Prezentace aktuálního postupu.pptx
@@ -14,6 +14,8 @@
     <p:sldId id="262" r:id="rId8"/>
     <p:sldId id="263" r:id="rId9"/>
     <p:sldId id="264" r:id="rId10"/>
+    <p:sldId id="265" r:id="rId11"/>
+    <p:sldId id="266" r:id="rId12"/>
   </p:sldIdLst>
   <p:sldSz cx="12192000" cy="6858000"/>
   <p:notesSz cx="6858000" cy="9144000"/>
@@ -290,7 +292,7 @@
             <a:fld id="{87DE6118-2437-4B30-8E3C-4D2BE6020583}" type="datetimeFigureOut">
               <a:rPr lang="en-US" dirty="0"/>
               <a:pPr/>
-              <a:t>1/29/2025</a:t>
+              <a:t>2/5/2025</a:t>
             </a:fld>
             <a:endParaRPr lang="en-US" dirty="0"/>
           </a:p>
@@ -616,7 +618,7 @@
           <a:p>
             <a:fld id="{87DE6118-2437-4B30-8E3C-4D2BE6020583}" type="datetimeFigureOut">
               <a:rPr lang="en-US" dirty="0"/>
-              <a:t>1/29/2025</a:t>
+              <a:t>2/5/2025</a:t>
             </a:fld>
             <a:endParaRPr lang="en-US" dirty="0"/>
           </a:p>
@@ -791,7 +793,7 @@
           <a:p>
             <a:fld id="{87DE6118-2437-4B30-8E3C-4D2BE6020583}" type="datetimeFigureOut">
               <a:rPr lang="en-US" dirty="0"/>
-              <a:t>1/29/2025</a:t>
+              <a:t>2/5/2025</a:t>
             </a:fld>
             <a:endParaRPr lang="en-US" dirty="0"/>
           </a:p>
@@ -956,7 +958,7 @@
           <a:p>
             <a:fld id="{87DE6118-2437-4B30-8E3C-4D2BE6020583}" type="datetimeFigureOut">
               <a:rPr lang="en-US" dirty="0"/>
-              <a:t>1/29/2025</a:t>
+              <a:t>2/5/2025</a:t>
             </a:fld>
             <a:endParaRPr lang="en-US" dirty="0"/>
           </a:p>
@@ -1229,7 +1231,7 @@
             <a:fld id="{87DE6118-2437-4B30-8E3C-4D2BE6020583}" type="datetimeFigureOut">
               <a:rPr lang="en-US" dirty="0"/>
               <a:pPr/>
-              <a:t>1/29/2025</a:t>
+              <a:t>2/5/2025</a:t>
             </a:fld>
             <a:endParaRPr lang="en-US" dirty="0"/>
           </a:p>
@@ -1619,7 +1621,7 @@
           <a:p>
             <a:fld id="{87DE6118-2437-4B30-8E3C-4D2BE6020583}" type="datetimeFigureOut">
               <a:rPr lang="en-US" dirty="0"/>
-              <a:t>1/29/2025</a:t>
+              <a:t>2/5/2025</a:t>
             </a:fld>
             <a:endParaRPr lang="en-US" dirty="0"/>
           </a:p>
@@ -2091,7 +2093,7 @@
           <a:p>
             <a:fld id="{87DE6118-2437-4B30-8E3C-4D2BE6020583}" type="datetimeFigureOut">
               <a:rPr lang="en-US" dirty="0"/>
-              <a:t>1/29/2025</a:t>
+              <a:t>2/5/2025</a:t>
             </a:fld>
             <a:endParaRPr lang="en-US" dirty="0"/>
           </a:p>
@@ -2204,7 +2206,7 @@
           <a:p>
             <a:fld id="{87DE6118-2437-4B30-8E3C-4D2BE6020583}" type="datetimeFigureOut">
               <a:rPr lang="en-US" dirty="0"/>
-              <a:t>1/29/2025</a:t>
+              <a:t>2/5/2025</a:t>
             </a:fld>
             <a:endParaRPr lang="en-US" dirty="0"/>
           </a:p>
@@ -2294,7 +2296,7 @@
           <a:p>
             <a:fld id="{87DE6118-2437-4B30-8E3C-4D2BE6020583}" type="datetimeFigureOut">
               <a:rPr lang="en-US" dirty="0"/>
-              <a:t>1/29/2025</a:t>
+              <a:t>2/5/2025</a:t>
             </a:fld>
             <a:endParaRPr lang="en-US" dirty="0"/>
           </a:p>
@@ -2636,7 +2638,7 @@
             <a:fld id="{87DE6118-2437-4B30-8E3C-4D2BE6020583}" type="datetimeFigureOut">
               <a:rPr lang="en-US" dirty="0"/>
               <a:pPr/>
-              <a:t>1/29/2025</a:t>
+              <a:t>2/5/2025</a:t>
             </a:fld>
             <a:endParaRPr lang="en-US" dirty="0"/>
           </a:p>
@@ -3021,7 +3023,7 @@
             <a:fld id="{87DE6118-2437-4B30-8E3C-4D2BE6020583}" type="datetimeFigureOut">
               <a:rPr lang="en-US" dirty="0"/>
               <a:pPr/>
-              <a:t>1/29/2025</a:t>
+              <a:t>2/5/2025</a:t>
             </a:fld>
             <a:endParaRPr lang="en-US" dirty="0"/>
           </a:p>
@@ -3296,7 +3298,7 @@
             <a:fld id="{87DE6118-2437-4B30-8E3C-4D2BE6020583}" type="datetimeFigureOut">
               <a:rPr lang="en-US" dirty="0"/>
               <a:pPr/>
-              <a:t>1/29/2025</a:t>
+              <a:t>2/5/2025</a:t>
             </a:fld>
             <a:endParaRPr lang="en-US" dirty="0"/>
           </a:p>
@@ -3903,6 +3905,1005 @@
 </p:sld>
 </file>
 
+<file path=ppt/slides/slide10.xml><?xml version="1.0" encoding="utf-8"?>
+<p:sld xmlns:a="http://schemas.openxmlformats.org/drawingml/2006/main" xmlns:r="http://schemas.openxmlformats.org/officeDocument/2006/relationships" xmlns:p="http://schemas.openxmlformats.org/presentationml/2006/main">
+  <p:cSld>
+    <p:bg>
+      <p:bgPr>
+        <a:solidFill>
+          <a:schemeClr val="bg2"/>
+        </a:solidFill>
+        <a:effectLst/>
+      </p:bgPr>
+    </p:bg>
+    <p:spTree>
+      <p:nvGrpSpPr>
+        <p:cNvPr id="1" name=""/>
+        <p:cNvGrpSpPr/>
+        <p:nvPr/>
+      </p:nvGrpSpPr>
+      <p:grpSpPr>
+        <a:xfrm>
+          <a:off x="0" y="0"/>
+          <a:ext cx="0" cy="0"/>
+          <a:chOff x="0" y="0"/>
+          <a:chExt cx="0" cy="0"/>
+        </a:xfrm>
+      </p:grpSpPr>
+      <p:sp useBgFill="1">
+        <p:nvSpPr>
+          <p:cNvPr id="17" name="Rectangle 11">
+            <a:extLst>
+              <a:ext uri="{FF2B5EF4-FFF2-40B4-BE49-F238E27FC236}">
+                <a16:creationId xmlns:a16="http://schemas.microsoft.com/office/drawing/2014/main" id="{48C110B4-D26A-44C6-8576-236CA24E98C1}"/>
+              </a:ext>
+              <a:ext uri="{C183D7F6-B498-43B3-948B-1728B52AA6E4}">
+                <adec:decorative xmlns:adec="http://schemas.microsoft.com/office/drawing/2017/decorative" val="1"/>
+              </a:ext>
+            </a:extLst>
+          </p:cNvPr>
+          <p:cNvSpPr>
+            <a:spLocks noGrp="1" noRot="1" noChangeAspect="1" noMove="1" noResize="1" noEditPoints="1" noAdjustHandles="1" noChangeArrowheads="1" noChangeShapeType="1" noTextEdit="1"/>
+          </p:cNvSpPr>
+          <p:nvPr>
+            <p:extLst>
+              <p:ext uri="{386F3935-93C4-4BCD-93E2-E3B085C9AB24}">
+                <p16:designElem xmlns:p16="http://schemas.microsoft.com/office/powerpoint/2015/main" val="1"/>
+              </p:ext>
+            </p:extLst>
+          </p:nvPr>
+        </p:nvSpPr>
+        <p:spPr>
+          <a:xfrm>
+            <a:off x="0" y="0"/>
+            <a:ext cx="12188952" cy="6858000"/>
+          </a:xfrm>
+          <a:prstGeom prst="rect">
+            <a:avLst/>
+          </a:prstGeom>
+          <a:ln>
+            <a:noFill/>
+          </a:ln>
+        </p:spPr>
+        <p:style>
+          <a:lnRef idx="2">
+            <a:schemeClr val="accent1">
+              <a:shade val="50000"/>
+            </a:schemeClr>
+          </a:lnRef>
+          <a:fillRef idx="1">
+            <a:schemeClr val="accent1"/>
+          </a:fillRef>
+          <a:effectRef idx="0">
+            <a:schemeClr val="accent1"/>
+          </a:effectRef>
+          <a:fontRef idx="minor">
+            <a:schemeClr val="lt1"/>
+          </a:fontRef>
+        </p:style>
+        <p:txBody>
+          <a:bodyPr rtlCol="0" anchor="ctr"/>
+          <a:lstStyle/>
+          <a:p>
+            <a:pPr algn="ctr"/>
+            <a:endParaRPr lang="en-US"/>
+          </a:p>
+        </p:txBody>
+      </p:sp>
+      <p:sp>
+        <p:nvSpPr>
+          <p:cNvPr id="2" name="Nadpis 1">
+            <a:extLst>
+              <a:ext uri="{FF2B5EF4-FFF2-40B4-BE49-F238E27FC236}">
+                <a16:creationId xmlns:a16="http://schemas.microsoft.com/office/drawing/2014/main" id="{8AE25249-387A-80DD-4C0A-F1F902373365}"/>
+              </a:ext>
+            </a:extLst>
+          </p:cNvPr>
+          <p:cNvSpPr>
+            <a:spLocks noGrp="1"/>
+          </p:cNvSpPr>
+          <p:nvPr>
+            <p:ph type="title"/>
+          </p:nvPr>
+        </p:nvSpPr>
+        <p:spPr>
+          <a:xfrm>
+            <a:off x="1021750" y="4278245"/>
+            <a:ext cx="4913384" cy="1762969"/>
+          </a:xfrm>
+        </p:spPr>
+        <p:txBody>
+          <a:bodyPr>
+            <a:normAutofit/>
+          </a:bodyPr>
+          <a:lstStyle/>
+          <a:p>
+            <a:endParaRPr lang="cs-CZ"/>
+          </a:p>
+        </p:txBody>
+      </p:sp>
+      <p:pic>
+        <p:nvPicPr>
+          <p:cNvPr id="7" name="Obrázek 6">
+            <a:extLst>
+              <a:ext uri="{FF2B5EF4-FFF2-40B4-BE49-F238E27FC236}">
+                <a16:creationId xmlns:a16="http://schemas.microsoft.com/office/drawing/2014/main" id="{2B8E775A-ACBA-872D-E38C-254CB5C02D31}"/>
+              </a:ext>
+            </a:extLst>
+          </p:cNvPr>
+          <p:cNvPicPr>
+            <a:picLocks noChangeAspect="1"/>
+          </p:cNvPicPr>
+          <p:nvPr/>
+        </p:nvPicPr>
+        <p:blipFill>
+          <a:blip r:embed="rId2"/>
+          <a:stretch>
+            <a:fillRect/>
+          </a:stretch>
+        </p:blipFill>
+        <p:spPr>
+          <a:xfrm>
+            <a:off x="2673049" y="1076325"/>
+            <a:ext cx="3368364" cy="4567276"/>
+          </a:xfrm>
+          <a:prstGeom prst="rect">
+            <a:avLst/>
+          </a:prstGeom>
+        </p:spPr>
+      </p:pic>
+      <p:pic>
+        <p:nvPicPr>
+          <p:cNvPr id="5" name="Obrázek 4">
+            <a:extLst>
+              <a:ext uri="{FF2B5EF4-FFF2-40B4-BE49-F238E27FC236}">
+                <a16:creationId xmlns:a16="http://schemas.microsoft.com/office/drawing/2014/main" id="{60BC5EA5-03FD-254C-EE7B-97A5306B9FFA}"/>
+              </a:ext>
+            </a:extLst>
+          </p:cNvPr>
+          <p:cNvPicPr>
+            <a:picLocks noChangeAspect="1"/>
+          </p:cNvPicPr>
+          <p:nvPr/>
+        </p:nvPicPr>
+        <p:blipFill>
+          <a:blip r:embed="rId3"/>
+          <a:stretch>
+            <a:fillRect/>
+          </a:stretch>
+        </p:blipFill>
+        <p:spPr>
+          <a:xfrm>
+            <a:off x="6784468" y="1050376"/>
+            <a:ext cx="3368364" cy="4593225"/>
+          </a:xfrm>
+          <a:prstGeom prst="rect">
+            <a:avLst/>
+          </a:prstGeom>
+        </p:spPr>
+      </p:pic>
+      <p:sp>
+        <p:nvSpPr>
+          <p:cNvPr id="18" name="Freeform: Shape 13">
+            <a:extLst>
+              <a:ext uri="{FF2B5EF4-FFF2-40B4-BE49-F238E27FC236}">
+                <a16:creationId xmlns:a16="http://schemas.microsoft.com/office/drawing/2014/main" id="{5BFD4DBB-3229-4DF6-A68A-CD91F8325879}"/>
+              </a:ext>
+              <a:ext uri="{C183D7F6-B498-43B3-948B-1728B52AA6E4}">
+                <adec:decorative xmlns:adec="http://schemas.microsoft.com/office/drawing/2017/decorative" val="1"/>
+              </a:ext>
+            </a:extLst>
+          </p:cNvPr>
+          <p:cNvSpPr>
+            <a:spLocks noGrp="1" noRot="1" noChangeAspect="1" noMove="1" noResize="1" noEditPoints="1" noAdjustHandles="1" noChangeArrowheads="1" noChangeShapeType="1" noTextEdit="1"/>
+          </p:cNvSpPr>
+          <p:nvPr>
+            <p:extLst>
+              <p:ext uri="{386F3935-93C4-4BCD-93E2-E3B085C9AB24}">
+                <p16:designElem xmlns:p16="http://schemas.microsoft.com/office/powerpoint/2015/main" val="1"/>
+              </p:ext>
+            </p:extLst>
+          </p:nvPr>
+        </p:nvSpPr>
+        <p:spPr bwMode="auto">
+          <a:xfrm flipH="1" flipV="1">
+            <a:off x="434936" y="3856976"/>
+            <a:ext cx="1957171" cy="1103687"/>
+          </a:xfrm>
+          <a:custGeom>
+            <a:avLst/>
+            <a:gdLst>
+              <a:gd name="connsiteX0" fmla="*/ 2017702 w 2017702"/>
+              <a:gd name="connsiteY0" fmla="*/ 1137821 h 1137821"/>
+              <a:gd name="connsiteX1" fmla="*/ 404 w 2017702"/>
+              <a:gd name="connsiteY1" fmla="*/ 1137821 h 1137821"/>
+              <a:gd name="connsiteX2" fmla="*/ 0 w 2017702"/>
+              <a:gd name="connsiteY2" fmla="*/ 900216 h 1137821"/>
+              <a:gd name="connsiteX3" fmla="*/ 1767759 w 2017702"/>
+              <a:gd name="connsiteY3" fmla="*/ 901031 h 1137821"/>
+              <a:gd name="connsiteX4" fmla="*/ 1767759 w 2017702"/>
+              <a:gd name="connsiteY4" fmla="*/ 0 h 1137821"/>
+              <a:gd name="connsiteX5" fmla="*/ 2017702 w 2017702"/>
+              <a:gd name="connsiteY5" fmla="*/ 0 h 1137821"/>
+            </a:gdLst>
+            <a:ahLst/>
+            <a:cxnLst>
+              <a:cxn ang="0">
+                <a:pos x="connsiteX0" y="connsiteY0"/>
+              </a:cxn>
+              <a:cxn ang="0">
+                <a:pos x="connsiteX1" y="connsiteY1"/>
+              </a:cxn>
+              <a:cxn ang="0">
+                <a:pos x="connsiteX2" y="connsiteY2"/>
+              </a:cxn>
+              <a:cxn ang="0">
+                <a:pos x="connsiteX3" y="connsiteY3"/>
+              </a:cxn>
+              <a:cxn ang="0">
+                <a:pos x="connsiteX4" y="connsiteY4"/>
+              </a:cxn>
+              <a:cxn ang="0">
+                <a:pos x="connsiteX5" y="connsiteY5"/>
+              </a:cxn>
+            </a:cxnLst>
+            <a:rect l="l" t="t" r="r" b="b"/>
+            <a:pathLst>
+              <a:path w="2017702" h="1137821">
+                <a:moveTo>
+                  <a:pt x="2017702" y="1137821"/>
+                </a:moveTo>
+                <a:lnTo>
+                  <a:pt x="404" y="1137821"/>
+                </a:lnTo>
+                <a:cubicBezTo>
+                  <a:pt x="-404" y="1055814"/>
+                  <a:pt x="807" y="982224"/>
+                  <a:pt x="0" y="900216"/>
+                </a:cubicBezTo>
+                <a:lnTo>
+                  <a:pt x="1767759" y="901031"/>
+                </a:lnTo>
+                <a:lnTo>
+                  <a:pt x="1767759" y="0"/>
+                </a:lnTo>
+                <a:lnTo>
+                  <a:pt x="2017702" y="0"/>
+                </a:lnTo>
+                <a:close/>
+              </a:path>
+            </a:pathLst>
+          </a:custGeom>
+          <a:solidFill>
+            <a:schemeClr val="tx2">
+              <a:alpha val="80000"/>
+            </a:schemeClr>
+          </a:solidFill>
+          <a:ln w="0">
+            <a:noFill/>
+            <a:prstDash val="solid"/>
+            <a:round/>
+            <a:headEnd/>
+            <a:tailEnd/>
+          </a:ln>
+        </p:spPr>
+        <p:txBody>
+          <a:bodyPr/>
+          <a:lstStyle/>
+          <a:p>
+            <a:endParaRPr lang="cs-CZ"/>
+          </a:p>
+        </p:txBody>
+      </p:sp>
+      <p:sp>
+        <p:nvSpPr>
+          <p:cNvPr id="3" name="Zástupný obsah 2">
+            <a:extLst>
+              <a:ext uri="{FF2B5EF4-FFF2-40B4-BE49-F238E27FC236}">
+                <a16:creationId xmlns:a16="http://schemas.microsoft.com/office/drawing/2014/main" id="{24794380-B91B-60EA-9094-EB14EC5CAE0C}"/>
+              </a:ext>
+            </a:extLst>
+          </p:cNvPr>
+          <p:cNvSpPr>
+            <a:spLocks noGrp="1"/>
+          </p:cNvSpPr>
+          <p:nvPr>
+            <p:ph idx="1"/>
+          </p:nvPr>
+        </p:nvSpPr>
+        <p:spPr>
+          <a:xfrm>
+            <a:off x="6253810" y="4278246"/>
+            <a:ext cx="4718989" cy="1841856"/>
+          </a:xfrm>
+        </p:spPr>
+        <p:txBody>
+          <a:bodyPr>
+            <a:normAutofit/>
+          </a:bodyPr>
+          <a:lstStyle/>
+          <a:p>
+            <a:endParaRPr lang="cs-CZ" sz="1800"/>
+          </a:p>
+        </p:txBody>
+      </p:sp>
+      <p:sp>
+        <p:nvSpPr>
+          <p:cNvPr id="16" name="Freeform: Shape 15">
+            <a:extLst>
+              <a:ext uri="{FF2B5EF4-FFF2-40B4-BE49-F238E27FC236}">
+                <a16:creationId xmlns:a16="http://schemas.microsoft.com/office/drawing/2014/main" id="{792979E5-1F93-4CE3-975E-3CAEC618BFB3}"/>
+              </a:ext>
+              <a:ext uri="{C183D7F6-B498-43B3-948B-1728B52AA6E4}">
+                <adec:decorative xmlns:adec="http://schemas.microsoft.com/office/drawing/2017/decorative" val="1"/>
+              </a:ext>
+            </a:extLst>
+          </p:cNvPr>
+          <p:cNvSpPr>
+            <a:spLocks noGrp="1" noRot="1" noChangeAspect="1" noMove="1" noResize="1" noEditPoints="1" noAdjustHandles="1" noChangeArrowheads="1" noChangeShapeType="1" noTextEdit="1"/>
+          </p:cNvSpPr>
+          <p:nvPr>
+            <p:extLst>
+              <p:ext uri="{386F3935-93C4-4BCD-93E2-E3B085C9AB24}">
+                <p16:designElem xmlns:p16="http://schemas.microsoft.com/office/powerpoint/2015/main" val="1"/>
+              </p:ext>
+            </p:extLst>
+          </p:nvPr>
+        </p:nvSpPr>
+        <p:spPr bwMode="auto">
+          <a:xfrm>
+            <a:off x="9796837" y="5311230"/>
+            <a:ext cx="2042265" cy="1213486"/>
+          </a:xfrm>
+          <a:custGeom>
+            <a:avLst/>
+            <a:gdLst>
+              <a:gd name="connsiteX0" fmla="*/ 1844618 w 2105428"/>
+              <a:gd name="connsiteY0" fmla="*/ 0 h 1251016"/>
+              <a:gd name="connsiteX1" fmla="*/ 2105428 w 2105428"/>
+              <a:gd name="connsiteY1" fmla="*/ 0 h 1251016"/>
+              <a:gd name="connsiteX2" fmla="*/ 2105428 w 2105428"/>
+              <a:gd name="connsiteY2" fmla="*/ 1251016 h 1251016"/>
+              <a:gd name="connsiteX3" fmla="*/ 421 w 2105428"/>
+              <a:gd name="connsiteY3" fmla="*/ 1251016 h 1251016"/>
+              <a:gd name="connsiteX4" fmla="*/ 0 w 2105428"/>
+              <a:gd name="connsiteY4" fmla="*/ 1003081 h 1251016"/>
+              <a:gd name="connsiteX5" fmla="*/ 1844618 w 2105428"/>
+              <a:gd name="connsiteY5" fmla="*/ 1003931 h 1251016"/>
+            </a:gdLst>
+            <a:ahLst/>
+            <a:cxnLst>
+              <a:cxn ang="0">
+                <a:pos x="connsiteX0" y="connsiteY0"/>
+              </a:cxn>
+              <a:cxn ang="0">
+                <a:pos x="connsiteX1" y="connsiteY1"/>
+              </a:cxn>
+              <a:cxn ang="0">
+                <a:pos x="connsiteX2" y="connsiteY2"/>
+              </a:cxn>
+              <a:cxn ang="0">
+                <a:pos x="connsiteX3" y="connsiteY3"/>
+              </a:cxn>
+              <a:cxn ang="0">
+                <a:pos x="connsiteX4" y="connsiteY4"/>
+              </a:cxn>
+              <a:cxn ang="0">
+                <a:pos x="connsiteX5" y="connsiteY5"/>
+              </a:cxn>
+            </a:cxnLst>
+            <a:rect l="l" t="t" r="r" b="b"/>
+            <a:pathLst>
+              <a:path w="2105428" h="1251016">
+                <a:moveTo>
+                  <a:pt x="1844618" y="0"/>
+                </a:moveTo>
+                <a:lnTo>
+                  <a:pt x="2105428" y="0"/>
+                </a:lnTo>
+                <a:lnTo>
+                  <a:pt x="2105428" y="1251016"/>
+                </a:lnTo>
+                <a:lnTo>
+                  <a:pt x="421" y="1251016"/>
+                </a:lnTo>
+                <a:cubicBezTo>
+                  <a:pt x="-421" y="1165443"/>
+                  <a:pt x="842" y="1088654"/>
+                  <a:pt x="0" y="1003081"/>
+                </a:cubicBezTo>
+                <a:lnTo>
+                  <a:pt x="1844618" y="1003931"/>
+                </a:lnTo>
+                <a:close/>
+              </a:path>
+            </a:pathLst>
+          </a:custGeom>
+          <a:solidFill>
+            <a:schemeClr val="tx2">
+              <a:alpha val="80000"/>
+            </a:schemeClr>
+          </a:solidFill>
+          <a:ln w="0">
+            <a:noFill/>
+            <a:prstDash val="solid"/>
+            <a:round/>
+            <a:headEnd/>
+            <a:tailEnd/>
+          </a:ln>
+        </p:spPr>
+        <p:txBody>
+          <a:bodyPr/>
+          <a:lstStyle/>
+          <a:p>
+            <a:endParaRPr lang="cs-CZ"/>
+          </a:p>
+        </p:txBody>
+      </p:sp>
+    </p:spTree>
+    <p:extLst>
+      <p:ext uri="{BB962C8B-B14F-4D97-AF65-F5344CB8AC3E}">
+        <p14:creationId xmlns:p14="http://schemas.microsoft.com/office/powerpoint/2010/main" val="3083626243"/>
+      </p:ext>
+    </p:extLst>
+  </p:cSld>
+  <p:clrMapOvr>
+    <a:masterClrMapping/>
+  </p:clrMapOvr>
+</p:sld>
+</file>
+
+<file path=ppt/slides/slide11.xml><?xml version="1.0" encoding="utf-8"?>
+<p:sld xmlns:a="http://schemas.openxmlformats.org/drawingml/2006/main" xmlns:r="http://schemas.openxmlformats.org/officeDocument/2006/relationships" xmlns:p="http://schemas.openxmlformats.org/presentationml/2006/main">
+  <p:cSld>
+    <p:bg>
+      <p:bgPr>
+        <a:solidFill>
+          <a:schemeClr val="bg2"/>
+        </a:solidFill>
+        <a:effectLst/>
+      </p:bgPr>
+    </p:bg>
+    <p:spTree>
+      <p:nvGrpSpPr>
+        <p:cNvPr id="1" name=""/>
+        <p:cNvGrpSpPr/>
+        <p:nvPr/>
+      </p:nvGrpSpPr>
+      <p:grpSpPr>
+        <a:xfrm>
+          <a:off x="0" y="0"/>
+          <a:ext cx="0" cy="0"/>
+          <a:chOff x="0" y="0"/>
+          <a:chExt cx="0" cy="0"/>
+        </a:xfrm>
+      </p:grpSpPr>
+      <p:sp useBgFill="1">
+        <p:nvSpPr>
+          <p:cNvPr id="14" name="Rectangle 13">
+            <a:extLst>
+              <a:ext uri="{FF2B5EF4-FFF2-40B4-BE49-F238E27FC236}">
+                <a16:creationId xmlns:a16="http://schemas.microsoft.com/office/drawing/2014/main" id="{D9D9D0AB-1E2F-44A8-B9C6-FA4098301883}"/>
+              </a:ext>
+              <a:ext uri="{C183D7F6-B498-43B3-948B-1728B52AA6E4}">
+                <adec:decorative xmlns:adec="http://schemas.microsoft.com/office/drawing/2017/decorative" val="1"/>
+              </a:ext>
+            </a:extLst>
+          </p:cNvPr>
+          <p:cNvSpPr>
+            <a:spLocks noGrp="1" noRot="1" noChangeAspect="1" noMove="1" noResize="1" noEditPoints="1" noAdjustHandles="1" noChangeArrowheads="1" noChangeShapeType="1" noTextEdit="1"/>
+          </p:cNvSpPr>
+          <p:nvPr>
+            <p:extLst>
+              <p:ext uri="{386F3935-93C4-4BCD-93E2-E3B085C9AB24}">
+                <p16:designElem xmlns:p16="http://schemas.microsoft.com/office/powerpoint/2015/main" val="1"/>
+              </p:ext>
+            </p:extLst>
+          </p:nvPr>
+        </p:nvSpPr>
+        <p:spPr>
+          <a:xfrm>
+            <a:off x="0" y="0"/>
+            <a:ext cx="12192000" cy="6858000"/>
+          </a:xfrm>
+          <a:prstGeom prst="rect">
+            <a:avLst/>
+          </a:prstGeom>
+          <a:ln>
+            <a:noFill/>
+          </a:ln>
+        </p:spPr>
+        <p:style>
+          <a:lnRef idx="2">
+            <a:schemeClr val="accent1">
+              <a:shade val="50000"/>
+            </a:schemeClr>
+          </a:lnRef>
+          <a:fillRef idx="1">
+            <a:schemeClr val="accent1"/>
+          </a:fillRef>
+          <a:effectRef idx="0">
+            <a:schemeClr val="accent1"/>
+          </a:effectRef>
+          <a:fontRef idx="minor">
+            <a:schemeClr val="lt1"/>
+          </a:fontRef>
+        </p:style>
+        <p:txBody>
+          <a:bodyPr rtlCol="0" anchor="ctr"/>
+          <a:lstStyle/>
+          <a:p>
+            <a:pPr algn="ctr"/>
+            <a:endParaRPr lang="en-US"/>
+          </a:p>
+        </p:txBody>
+      </p:sp>
+      <p:sp>
+        <p:nvSpPr>
+          <p:cNvPr id="2" name="Nadpis 1">
+            <a:extLst>
+              <a:ext uri="{FF2B5EF4-FFF2-40B4-BE49-F238E27FC236}">
+                <a16:creationId xmlns:a16="http://schemas.microsoft.com/office/drawing/2014/main" id="{1C58EB67-057B-C21A-CDEB-F51465A3B57F}"/>
+              </a:ext>
+            </a:extLst>
+          </p:cNvPr>
+          <p:cNvSpPr>
+            <a:spLocks noGrp="1"/>
+          </p:cNvSpPr>
+          <p:nvPr>
+            <p:ph type="title"/>
+          </p:nvPr>
+        </p:nvSpPr>
+        <p:spPr>
+          <a:xfrm>
+            <a:off x="903514" y="3665054"/>
+            <a:ext cx="9697586" cy="1048459"/>
+          </a:xfrm>
+        </p:spPr>
+        <p:txBody>
+          <a:bodyPr anchor="ctr">
+            <a:normAutofit/>
+          </a:bodyPr>
+          <a:lstStyle/>
+          <a:p>
+            <a:r>
+              <a:rPr lang="cs-CZ" sz="3600"/>
+              <a:t> </a:t>
+            </a:r>
+          </a:p>
+        </p:txBody>
+      </p:sp>
+      <p:pic>
+        <p:nvPicPr>
+          <p:cNvPr id="9" name="Obrázek 8">
+            <a:extLst>
+              <a:ext uri="{FF2B5EF4-FFF2-40B4-BE49-F238E27FC236}">
+                <a16:creationId xmlns:a16="http://schemas.microsoft.com/office/drawing/2014/main" id="{F5EA5A79-ACFA-F537-B001-26632615F92C}"/>
+              </a:ext>
+            </a:extLst>
+          </p:cNvPr>
+          <p:cNvPicPr>
+            <a:picLocks noChangeAspect="1"/>
+          </p:cNvPicPr>
+          <p:nvPr/>
+        </p:nvPicPr>
+        <p:blipFill>
+          <a:blip r:embed="rId2"/>
+          <a:stretch>
+            <a:fillRect/>
+          </a:stretch>
+        </p:blipFill>
+        <p:spPr>
+          <a:xfrm>
+            <a:off x="7607039" y="3764060"/>
+            <a:ext cx="3897575" cy="2689326"/>
+          </a:xfrm>
+          <a:prstGeom prst="rect">
+            <a:avLst/>
+          </a:prstGeom>
+        </p:spPr>
+      </p:pic>
+      <p:sp>
+        <p:nvSpPr>
+          <p:cNvPr id="16" name="Freeform: Shape 15">
+            <a:extLst>
+              <a:ext uri="{FF2B5EF4-FFF2-40B4-BE49-F238E27FC236}">
+                <a16:creationId xmlns:a16="http://schemas.microsoft.com/office/drawing/2014/main" id="{00106F80-B138-4C27-AEAE-350D5506E64F}"/>
+              </a:ext>
+              <a:ext uri="{C183D7F6-B498-43B3-948B-1728B52AA6E4}">
+                <adec:decorative xmlns:adec="http://schemas.microsoft.com/office/drawing/2017/decorative" val="1"/>
+              </a:ext>
+            </a:extLst>
+          </p:cNvPr>
+          <p:cNvSpPr>
+            <a:spLocks noGrp="1" noRot="1" noChangeAspect="1" noMove="1" noResize="1" noEditPoints="1" noAdjustHandles="1" noChangeArrowheads="1" noChangeShapeType="1" noTextEdit="1"/>
+          </p:cNvSpPr>
+          <p:nvPr>
+            <p:extLst>
+              <p:ext uri="{386F3935-93C4-4BCD-93E2-E3B085C9AB24}">
+                <p16:designElem xmlns:p16="http://schemas.microsoft.com/office/powerpoint/2015/main" val="1"/>
+              </p:ext>
+            </p:extLst>
+          </p:nvPr>
+        </p:nvSpPr>
+        <p:spPr bwMode="auto">
+          <a:xfrm flipV="1">
+            <a:off x="1611062" y="710273"/>
+            <a:ext cx="2308583" cy="2084882"/>
+          </a:xfrm>
+          <a:custGeom>
+            <a:avLst/>
+            <a:gdLst>
+              <a:gd name="connsiteX0" fmla="*/ 462 w 2308583"/>
+              <a:gd name="connsiteY0" fmla="*/ 2084882 h 2084882"/>
+              <a:gd name="connsiteX1" fmla="*/ 2308583 w 2308583"/>
+              <a:gd name="connsiteY1" fmla="*/ 2084882 h 2084882"/>
+              <a:gd name="connsiteX2" fmla="*/ 2308583 w 2308583"/>
+              <a:gd name="connsiteY2" fmla="*/ 0 h 2084882"/>
+              <a:gd name="connsiteX3" fmla="*/ 2022607 w 2308583"/>
+              <a:gd name="connsiteY3" fmla="*/ 0 h 2084882"/>
+              <a:gd name="connsiteX4" fmla="*/ 2022607 w 2308583"/>
+              <a:gd name="connsiteY4" fmla="*/ 1813955 h 2084882"/>
+              <a:gd name="connsiteX5" fmla="*/ 0 w 2308583"/>
+              <a:gd name="connsiteY5" fmla="*/ 1813023 h 2084882"/>
+              <a:gd name="connsiteX6" fmla="*/ 462 w 2308583"/>
+              <a:gd name="connsiteY6" fmla="*/ 2084882 h 2084882"/>
+            </a:gdLst>
+            <a:ahLst/>
+            <a:cxnLst>
+              <a:cxn ang="0">
+                <a:pos x="connsiteX0" y="connsiteY0"/>
+              </a:cxn>
+              <a:cxn ang="0">
+                <a:pos x="connsiteX1" y="connsiteY1"/>
+              </a:cxn>
+              <a:cxn ang="0">
+                <a:pos x="connsiteX2" y="connsiteY2"/>
+              </a:cxn>
+              <a:cxn ang="0">
+                <a:pos x="connsiteX3" y="connsiteY3"/>
+              </a:cxn>
+              <a:cxn ang="0">
+                <a:pos x="connsiteX4" y="connsiteY4"/>
+              </a:cxn>
+              <a:cxn ang="0">
+                <a:pos x="connsiteX5" y="connsiteY5"/>
+              </a:cxn>
+              <a:cxn ang="0">
+                <a:pos x="connsiteX6" y="connsiteY6"/>
+              </a:cxn>
+            </a:cxnLst>
+            <a:rect l="l" t="t" r="r" b="b"/>
+            <a:pathLst>
+              <a:path w="2308583" h="2084882">
+                <a:moveTo>
+                  <a:pt x="462" y="2084882"/>
+                </a:moveTo>
+                <a:lnTo>
+                  <a:pt x="2308583" y="2084882"/>
+                </a:lnTo>
+                <a:lnTo>
+                  <a:pt x="2308583" y="0"/>
+                </a:lnTo>
+                <a:lnTo>
+                  <a:pt x="2022607" y="0"/>
+                </a:lnTo>
+                <a:lnTo>
+                  <a:pt x="2022607" y="1813955"/>
+                </a:lnTo>
+                <a:lnTo>
+                  <a:pt x="0" y="1813023"/>
+                </a:lnTo>
+                <a:cubicBezTo>
+                  <a:pt x="923" y="1906853"/>
+                  <a:pt x="-462" y="1991052"/>
+                  <a:pt x="462" y="2084882"/>
+                </a:cubicBezTo>
+                <a:close/>
+              </a:path>
+            </a:pathLst>
+          </a:custGeom>
+          <a:solidFill>
+            <a:schemeClr val="tx1">
+              <a:lumMod val="75000"/>
+              <a:lumOff val="25000"/>
+            </a:schemeClr>
+          </a:solidFill>
+          <a:ln w="0">
+            <a:noFill/>
+            <a:prstDash val="solid"/>
+            <a:round/>
+            <a:headEnd/>
+            <a:tailEnd/>
+          </a:ln>
+        </p:spPr>
+        <p:txBody>
+          <a:bodyPr/>
+          <a:lstStyle/>
+          <a:p>
+            <a:endParaRPr lang="cs-CZ"/>
+          </a:p>
+        </p:txBody>
+      </p:sp>
+      <p:pic>
+        <p:nvPicPr>
+          <p:cNvPr id="7" name="Obrázek 6">
+            <a:extLst>
+              <a:ext uri="{FF2B5EF4-FFF2-40B4-BE49-F238E27FC236}">
+                <a16:creationId xmlns:a16="http://schemas.microsoft.com/office/drawing/2014/main" id="{EBA4CBAF-574B-FBBE-79C6-1AB8821F26E1}"/>
+              </a:ext>
+            </a:extLst>
+          </p:cNvPr>
+          <p:cNvPicPr>
+            <a:picLocks noChangeAspect="1"/>
+          </p:cNvPicPr>
+          <p:nvPr/>
+        </p:nvPicPr>
+        <p:blipFill>
+          <a:blip r:embed="rId3"/>
+          <a:stretch>
+            <a:fillRect/>
+          </a:stretch>
+        </p:blipFill>
+        <p:spPr>
+          <a:xfrm>
+            <a:off x="4089013" y="469915"/>
+            <a:ext cx="3966809" cy="2727182"/>
+          </a:xfrm>
+          <a:prstGeom prst="rect">
+            <a:avLst/>
+          </a:prstGeom>
+        </p:spPr>
+      </p:pic>
+      <p:pic>
+        <p:nvPicPr>
+          <p:cNvPr id="5" name="Obrázek 4">
+            <a:extLst>
+              <a:ext uri="{FF2B5EF4-FFF2-40B4-BE49-F238E27FC236}">
+                <a16:creationId xmlns:a16="http://schemas.microsoft.com/office/drawing/2014/main" id="{6FF6A866-2278-D8CA-2193-8352639CA2D1}"/>
+              </a:ext>
+            </a:extLst>
+          </p:cNvPr>
+          <p:cNvPicPr>
+            <a:picLocks noChangeAspect="1"/>
+          </p:cNvPicPr>
+          <p:nvPr/>
+        </p:nvPicPr>
+        <p:blipFill>
+          <a:blip r:embed="rId4"/>
+          <a:stretch>
+            <a:fillRect/>
+          </a:stretch>
+        </p:blipFill>
+        <p:spPr>
+          <a:xfrm>
+            <a:off x="428483" y="3764060"/>
+            <a:ext cx="3967386" cy="2772530"/>
+          </a:xfrm>
+          <a:prstGeom prst="rect">
+            <a:avLst/>
+          </a:prstGeom>
+        </p:spPr>
+      </p:pic>
+      <p:sp>
+        <p:nvSpPr>
+          <p:cNvPr id="18" name="Freeform: Shape 17">
+            <a:extLst>
+              <a:ext uri="{FF2B5EF4-FFF2-40B4-BE49-F238E27FC236}">
+                <a16:creationId xmlns:a16="http://schemas.microsoft.com/office/drawing/2014/main" id="{DABC7F38-C8B8-4C20-82BE-82A52FF9C7E3}"/>
+              </a:ext>
+              <a:ext uri="{C183D7F6-B498-43B3-948B-1728B52AA6E4}">
+                <adec:decorative xmlns:adec="http://schemas.microsoft.com/office/drawing/2017/decorative" val="1"/>
+              </a:ext>
+            </a:extLst>
+          </p:cNvPr>
+          <p:cNvSpPr>
+            <a:spLocks noGrp="1" noRot="1" noChangeAspect="1" noMove="1" noResize="1" noEditPoints="1" noAdjustHandles="1" noChangeArrowheads="1" noChangeShapeType="1" noTextEdit="1"/>
+          </p:cNvSpPr>
+          <p:nvPr>
+            <p:extLst>
+              <p:ext uri="{386F3935-93C4-4BCD-93E2-E3B085C9AB24}">
+                <p16:designElem xmlns:p16="http://schemas.microsoft.com/office/powerpoint/2015/main" val="1"/>
+              </p:ext>
+            </p:extLst>
+          </p:nvPr>
+        </p:nvSpPr>
+        <p:spPr bwMode="auto">
+          <a:xfrm flipH="1">
+            <a:off x="8292517" y="1071683"/>
+            <a:ext cx="2308583" cy="2379788"/>
+          </a:xfrm>
+          <a:custGeom>
+            <a:avLst/>
+            <a:gdLst>
+              <a:gd name="connsiteX0" fmla="*/ 2308583 w 2308583"/>
+              <a:gd name="connsiteY0" fmla="*/ 0 h 2379788"/>
+              <a:gd name="connsiteX1" fmla="*/ 2022607 w 2308583"/>
+              <a:gd name="connsiteY1" fmla="*/ 0 h 2379788"/>
+              <a:gd name="connsiteX2" fmla="*/ 2022607 w 2308583"/>
+              <a:gd name="connsiteY2" fmla="*/ 2108861 h 2379788"/>
+              <a:gd name="connsiteX3" fmla="*/ 0 w 2308583"/>
+              <a:gd name="connsiteY3" fmla="*/ 2107929 h 2379788"/>
+              <a:gd name="connsiteX4" fmla="*/ 462 w 2308583"/>
+              <a:gd name="connsiteY4" fmla="*/ 2379788 h 2379788"/>
+              <a:gd name="connsiteX5" fmla="*/ 2308583 w 2308583"/>
+              <a:gd name="connsiteY5" fmla="*/ 2379788 h 2379788"/>
+            </a:gdLst>
+            <a:ahLst/>
+            <a:cxnLst>
+              <a:cxn ang="0">
+                <a:pos x="connsiteX0" y="connsiteY0"/>
+              </a:cxn>
+              <a:cxn ang="0">
+                <a:pos x="connsiteX1" y="connsiteY1"/>
+              </a:cxn>
+              <a:cxn ang="0">
+                <a:pos x="connsiteX2" y="connsiteY2"/>
+              </a:cxn>
+              <a:cxn ang="0">
+                <a:pos x="connsiteX3" y="connsiteY3"/>
+              </a:cxn>
+              <a:cxn ang="0">
+                <a:pos x="connsiteX4" y="connsiteY4"/>
+              </a:cxn>
+              <a:cxn ang="0">
+                <a:pos x="connsiteX5" y="connsiteY5"/>
+              </a:cxn>
+            </a:cxnLst>
+            <a:rect l="l" t="t" r="r" b="b"/>
+            <a:pathLst>
+              <a:path w="2308583" h="2379788">
+                <a:moveTo>
+                  <a:pt x="2308583" y="0"/>
+                </a:moveTo>
+                <a:lnTo>
+                  <a:pt x="2022607" y="0"/>
+                </a:lnTo>
+                <a:lnTo>
+                  <a:pt x="2022607" y="2108861"/>
+                </a:lnTo>
+                <a:lnTo>
+                  <a:pt x="0" y="2107929"/>
+                </a:lnTo>
+                <a:cubicBezTo>
+                  <a:pt x="923" y="2201759"/>
+                  <a:pt x="-462" y="2285958"/>
+                  <a:pt x="462" y="2379788"/>
+                </a:cubicBezTo>
+                <a:lnTo>
+                  <a:pt x="2308583" y="2379788"/>
+                </a:lnTo>
+                <a:close/>
+              </a:path>
+            </a:pathLst>
+          </a:custGeom>
+          <a:solidFill>
+            <a:schemeClr val="tx1">
+              <a:lumMod val="65000"/>
+              <a:lumOff val="35000"/>
+            </a:schemeClr>
+          </a:solidFill>
+          <a:ln w="0">
+            <a:noFill/>
+            <a:prstDash val="solid"/>
+            <a:round/>
+            <a:headEnd/>
+            <a:tailEnd/>
+          </a:ln>
+        </p:spPr>
+        <p:txBody>
+          <a:bodyPr/>
+          <a:lstStyle/>
+          <a:p>
+            <a:endParaRPr lang="cs-CZ"/>
+          </a:p>
+        </p:txBody>
+      </p:sp>
+      <p:sp>
+        <p:nvSpPr>
+          <p:cNvPr id="3" name="Zástupný obsah 2">
+            <a:extLst>
+              <a:ext uri="{FF2B5EF4-FFF2-40B4-BE49-F238E27FC236}">
+                <a16:creationId xmlns:a16="http://schemas.microsoft.com/office/drawing/2014/main" id="{A12D45D9-98A0-A36C-CD53-83388F3C1A0C}"/>
+              </a:ext>
+            </a:extLst>
+          </p:cNvPr>
+          <p:cNvSpPr>
+            <a:spLocks noGrp="1"/>
+          </p:cNvSpPr>
+          <p:nvPr>
+            <p:ph idx="1"/>
+          </p:nvPr>
+        </p:nvSpPr>
+        <p:spPr>
+          <a:xfrm>
+            <a:off x="903514" y="4735983"/>
+            <a:ext cx="7118268" cy="1538527"/>
+          </a:xfrm>
+        </p:spPr>
+        <p:txBody>
+          <a:bodyPr>
+            <a:normAutofit/>
+          </a:bodyPr>
+          <a:lstStyle/>
+          <a:p>
+            <a:endParaRPr lang="cs-CZ" dirty="0"/>
+          </a:p>
+        </p:txBody>
+      </p:sp>
+      <p:sp useBgFill="1">
+        <p:nvSpPr>
+          <p:cNvPr id="20" name="Rectangle 19">
+            <a:extLst>
+              <a:ext uri="{FF2B5EF4-FFF2-40B4-BE49-F238E27FC236}">
+                <a16:creationId xmlns:a16="http://schemas.microsoft.com/office/drawing/2014/main" id="{D8968742-1D40-4F6B-9272-064FD1631BB9}"/>
+              </a:ext>
+              <a:ext uri="{C183D7F6-B498-43B3-948B-1728B52AA6E4}">
+                <adec:decorative xmlns:adec="http://schemas.microsoft.com/office/drawing/2017/decorative" val="1"/>
+              </a:ext>
+            </a:extLst>
+          </p:cNvPr>
+          <p:cNvSpPr>
+            <a:spLocks noGrp="1" noRot="1" noChangeAspect="1" noMove="1" noResize="1" noEditPoints="1" noAdjustHandles="1" noChangeArrowheads="1" noChangeShapeType="1" noTextEdit="1"/>
+          </p:cNvSpPr>
+          <p:nvPr>
+            <p:extLst>
+              <p:ext uri="{386F3935-93C4-4BCD-93E2-E3B085C9AB24}">
+                <p16:designElem xmlns:p16="http://schemas.microsoft.com/office/powerpoint/2015/main" val="1"/>
+              </p:ext>
+            </p:extLst>
+          </p:nvPr>
+        </p:nvSpPr>
+        <p:spPr>
+          <a:xfrm>
+            <a:off x="4430486" y="6453386"/>
+            <a:ext cx="573314" cy="404614"/>
+          </a:xfrm>
+          <a:prstGeom prst="rect">
+            <a:avLst/>
+          </a:prstGeom>
+          <a:ln>
+            <a:noFill/>
+          </a:ln>
+        </p:spPr>
+        <p:style>
+          <a:lnRef idx="2">
+            <a:schemeClr val="accent1">
+              <a:shade val="50000"/>
+            </a:schemeClr>
+          </a:lnRef>
+          <a:fillRef idx="1">
+            <a:schemeClr val="accent1"/>
+          </a:fillRef>
+          <a:effectRef idx="0">
+            <a:schemeClr val="accent1"/>
+          </a:effectRef>
+          <a:fontRef idx="minor">
+            <a:schemeClr val="lt1"/>
+          </a:fontRef>
+        </p:style>
+        <p:txBody>
+          <a:bodyPr rtlCol="0" anchor="ctr"/>
+          <a:lstStyle/>
+          <a:p>
+            <a:pPr algn="ctr"/>
+            <a:endParaRPr lang="en-US"/>
+          </a:p>
+        </p:txBody>
+      </p:sp>
+    </p:spTree>
+    <p:extLst>
+      <p:ext uri="{BB962C8B-B14F-4D97-AF65-F5344CB8AC3E}">
+        <p14:creationId xmlns:p14="http://schemas.microsoft.com/office/powerpoint/2010/main" val="2191829328"/>
+      </p:ext>
+    </p:extLst>
+  </p:cSld>
+  <p:clrMapOvr>
+    <a:masterClrMapping/>
+  </p:clrMapOvr>
+</p:sld>
+</file>
+
 <file path=ppt/slides/slide2.xml><?xml version="1.0" encoding="utf-8"?>
 <p:sld xmlns:a="http://schemas.openxmlformats.org/drawingml/2006/main" xmlns:r="http://schemas.openxmlformats.org/officeDocument/2006/relationships" xmlns:p="http://schemas.openxmlformats.org/presentationml/2006/main">
   <p:cSld>

</xml_diff>